<commit_message>
Added timeline to presentation
</commit_message>
<xml_diff>
--- a/presentation/interim-presentation.pptx
+++ b/presentation/interim-presentation.pptx
@@ -5,10 +5,10 @@
     <p:sldMasterId id="2147483738" r:id="rId1"/>
   </p:sldMasterIdLst>
   <p:notesMasterIdLst>
-    <p:notesMasterId r:id="rId23"/>
+    <p:notesMasterId r:id="rId24"/>
   </p:notesMasterIdLst>
   <p:handoutMasterIdLst>
-    <p:handoutMasterId r:id="rId24"/>
+    <p:handoutMasterId r:id="rId25"/>
   </p:handoutMasterIdLst>
   <p:sldIdLst>
     <p:sldId id="260" r:id="rId2"/>
@@ -31,7 +31,8 @@
     <p:sldId id="273" r:id="rId19"/>
     <p:sldId id="274" r:id="rId20"/>
     <p:sldId id="279" r:id="rId21"/>
-    <p:sldId id="268" r:id="rId22"/>
+    <p:sldId id="294" r:id="rId22"/>
+    <p:sldId id="268" r:id="rId23"/>
   </p:sldIdLst>
   <p:sldSz cx="12192000" cy="6858000"/>
   <p:notesSz cx="7099300" cy="10234613"/>
@@ -1261,7 +1262,7 @@
               <a:pPr>
                 <a:defRPr/>
               </a:pPr>
-              <a:t>13.08.20</a:t>
+              <a:t>17.08.20</a:t>
             </a:fld>
             <a:endParaRPr lang="de-DE" altLang="de-DE"/>
           </a:p>
@@ -1495,7 +1496,7 @@
               <a:pPr>
                 <a:defRPr/>
               </a:pPr>
-              <a:t>13.08.20</a:t>
+              <a:t>17.08.20</a:t>
             </a:fld>
             <a:endParaRPr lang="de-DE" altLang="de-DE"/>
           </a:p>
@@ -6043,8 +6044,8 @@
           </a:p>
         </p:txBody>
       </p:sp>
-      <mc:AlternateContent xmlns:mc="http://schemas.openxmlformats.org/markup-compatibility/2006">
-        <mc:Choice xmlns:a14="http://schemas.microsoft.com/office/drawing/2010/main" Requires="a14">
+      <mc:AlternateContent xmlns:mc="http://schemas.openxmlformats.org/markup-compatibility/2006" xmlns:a14="http://schemas.microsoft.com/office/drawing/2010/main">
+        <mc:Choice Requires="a14">
           <p:graphicFrame>
             <p:nvGraphicFramePr>
               <p:cNvPr id="5" name="Tabelle 5">
@@ -6802,7 +6803,7 @@
             </a:graphic>
           </p:graphicFrame>
         </mc:Choice>
-        <mc:Fallback>
+        <mc:Fallback xmlns="">
           <p:graphicFrame>
             <p:nvGraphicFramePr>
               <p:cNvPr id="5" name="Tabelle 5">
@@ -7339,8 +7340,8 @@
           </p:graphicFrame>
         </mc:Fallback>
       </mc:AlternateContent>
-      <mc:AlternateContent xmlns:mc="http://schemas.openxmlformats.org/markup-compatibility/2006">
-        <mc:Choice xmlns:a14="http://schemas.microsoft.com/office/drawing/2010/main" Requires="a14">
+      <mc:AlternateContent xmlns:mc="http://schemas.openxmlformats.org/markup-compatibility/2006" xmlns:a14="http://schemas.microsoft.com/office/drawing/2010/main">
+        <mc:Choice Requires="a14">
           <p:sp>
             <p:nvSpPr>
               <p:cNvPr id="6" name="Rechteck 5">
@@ -7648,7 +7649,7 @@
             </p:txBody>
           </p:sp>
         </mc:Choice>
-        <mc:Fallback>
+        <mc:Fallback xmlns="">
           <p:sp>
             <p:nvSpPr>
               <p:cNvPr id="6" name="Rechteck 5">
@@ -11407,8 +11408,8 @@
           </a:p>
         </p:txBody>
       </p:sp>
-      <mc:AlternateContent xmlns:mc="http://schemas.openxmlformats.org/markup-compatibility/2006">
-        <mc:Choice xmlns:a14="http://schemas.microsoft.com/office/drawing/2010/main" Requires="a14">
+      <mc:AlternateContent xmlns:mc="http://schemas.openxmlformats.org/markup-compatibility/2006" xmlns:a14="http://schemas.microsoft.com/office/drawing/2010/main">
+        <mc:Choice Requires="a14">
           <p:sp>
             <p:nvSpPr>
               <p:cNvPr id="5" name="Textfeld 4">
@@ -11437,6 +11438,7 @@
               </a:bodyPr>
               <a:lstStyle/>
               <a:p>
+                <a:pPr/>
                 <a14:m>
                   <m:oMathPara xmlns:m="http://schemas.openxmlformats.org/officeDocument/2006/math">
                     <m:oMathParaPr>
@@ -11457,7 +11459,7 @@
             </p:txBody>
           </p:sp>
         </mc:Choice>
-        <mc:Fallback>
+        <mc:Fallback xmlns="">
           <p:sp>
             <p:nvSpPr>
               <p:cNvPr id="5" name="Textfeld 4">
@@ -13137,6 +13139,100 @@
       </p:grpSpPr>
       <p:sp>
         <p:nvSpPr>
+          <p:cNvPr id="2" name="Titel 1">
+            <a:extLst>
+              <a:ext uri="{FF2B5EF4-FFF2-40B4-BE49-F238E27FC236}">
+                <a16:creationId xmlns:a16="http://schemas.microsoft.com/office/drawing/2014/main" id="{BAFDB945-9024-D44D-AD68-72E2A58712A6}"/>
+              </a:ext>
+            </a:extLst>
+          </p:cNvPr>
+          <p:cNvSpPr>
+            <a:spLocks noGrp="1"/>
+          </p:cNvSpPr>
+          <p:nvPr>
+            <p:ph type="title"/>
+          </p:nvPr>
+        </p:nvSpPr>
+        <p:spPr/>
+        <p:txBody>
+          <a:bodyPr/>
+          <a:lstStyle/>
+          <a:p>
+            <a:r>
+              <a:rPr lang="en-US" dirty="0"/>
+              <a:t>Schedule</a:t>
+            </a:r>
+          </a:p>
+        </p:txBody>
+      </p:sp>
+      <p:pic>
+        <p:nvPicPr>
+          <p:cNvPr id="10" name="Grafik 9">
+            <a:extLst>
+              <a:ext uri="{FF2B5EF4-FFF2-40B4-BE49-F238E27FC236}">
+                <a16:creationId xmlns:a16="http://schemas.microsoft.com/office/drawing/2014/main" id="{6954F224-A8CF-F942-95FE-D1B9819F3E01}"/>
+              </a:ext>
+            </a:extLst>
+          </p:cNvPr>
+          <p:cNvPicPr>
+            <a:picLocks noChangeAspect="1"/>
+          </p:cNvPicPr>
+          <p:nvPr/>
+        </p:nvPicPr>
+        <p:blipFill>
+          <a:blip r:embed="rId2">
+            <a:extLst>
+              <a:ext uri="{28A0092B-C50C-407E-A947-70E740481C1C}">
+                <a14:useLocalDpi xmlns:a14="http://schemas.microsoft.com/office/drawing/2010/main" val="0"/>
+              </a:ext>
+            </a:extLst>
+          </a:blip>
+          <a:stretch>
+            <a:fillRect/>
+          </a:stretch>
+        </p:blipFill>
+        <p:spPr>
+          <a:xfrm>
+            <a:off x="383999" y="863953"/>
+            <a:ext cx="11477727" cy="4610572"/>
+          </a:xfrm>
+          <a:prstGeom prst="rect">
+            <a:avLst/>
+          </a:prstGeom>
+        </p:spPr>
+      </p:pic>
+    </p:spTree>
+    <p:extLst>
+      <p:ext uri="{BB962C8B-B14F-4D97-AF65-F5344CB8AC3E}">
+        <p14:creationId xmlns:p14="http://schemas.microsoft.com/office/powerpoint/2010/main" val="111501511"/>
+      </p:ext>
+    </p:extLst>
+  </p:cSld>
+  <p:clrMapOvr>
+    <a:masterClrMapping/>
+  </p:clrMapOvr>
+</p:sld>
+</file>
+
+<file path=ppt/slides/slide22.xml><?xml version="1.0" encoding="utf-8"?>
+<p:sld xmlns:a="http://schemas.openxmlformats.org/drawingml/2006/main" xmlns:r="http://schemas.openxmlformats.org/officeDocument/2006/relationships" xmlns:p="http://schemas.openxmlformats.org/presentationml/2006/main">
+  <p:cSld>
+    <p:spTree>
+      <p:nvGrpSpPr>
+        <p:cNvPr id="1" name=""/>
+        <p:cNvGrpSpPr/>
+        <p:nvPr/>
+      </p:nvGrpSpPr>
+      <p:grpSpPr>
+        <a:xfrm>
+          <a:off x="0" y="0"/>
+          <a:ext cx="0" cy="0"/>
+          <a:chOff x="0" y="0"/>
+          <a:chExt cx="0" cy="0"/>
+        </a:xfrm>
+      </p:grpSpPr>
+      <p:sp>
+        <p:nvSpPr>
           <p:cNvPr id="23554" name="Textplatzhalter 1">
             <a:extLst>
               <a:ext uri="{FF2B5EF4-FFF2-40B4-BE49-F238E27FC236}">
@@ -13848,8 +13944,8 @@
           </a:p>
         </p:txBody>
       </p:sp>
-      <mc:AlternateContent xmlns:mc="http://schemas.openxmlformats.org/markup-compatibility/2006">
-        <mc:Choice xmlns:a14="http://schemas.microsoft.com/office/drawing/2010/main" Requires="a14">
+      <mc:AlternateContent xmlns:mc="http://schemas.openxmlformats.org/markup-compatibility/2006" xmlns:a14="http://schemas.microsoft.com/office/drawing/2010/main">
+        <mc:Choice Requires="a14">
           <p:sp>
             <p:nvSpPr>
               <p:cNvPr id="4" name="Textplatzhalter 3">
@@ -14022,7 +14118,7 @@
             </p:txBody>
           </p:sp>
         </mc:Choice>
-        <mc:Fallback>
+        <mc:Fallback xmlns="">
           <p:sp>
             <p:nvSpPr>
               <p:cNvPr id="4" name="Textplatzhalter 3">
@@ -14838,8 +14934,8 @@
           </a:graphicData>
         </a:graphic>
       </p:graphicFrame>
-      <mc:AlternateContent xmlns:mc="http://schemas.openxmlformats.org/markup-compatibility/2006">
-        <mc:Choice xmlns:a14="http://schemas.microsoft.com/office/drawing/2010/main" Requires="a14">
+      <mc:AlternateContent xmlns:mc="http://schemas.openxmlformats.org/markup-compatibility/2006" xmlns:a14="http://schemas.microsoft.com/office/drawing/2010/main">
+        <mc:Choice Requires="a14">
           <p:sp>
             <p:nvSpPr>
               <p:cNvPr id="8" name="Textplatzhalter 3">
@@ -15211,7 +15307,7 @@
             </p:txBody>
           </p:sp>
         </mc:Choice>
-        <mc:Fallback>
+        <mc:Fallback xmlns="">
           <p:sp>
             <p:nvSpPr>
               <p:cNvPr id="8" name="Textplatzhalter 3">
@@ -15626,8 +15722,8 @@
           </p:sp>
         </mc:Fallback>
       </mc:AlternateContent>
-      <mc:AlternateContent xmlns:mc="http://schemas.openxmlformats.org/markup-compatibility/2006">
-        <mc:Choice xmlns:a14="http://schemas.microsoft.com/office/drawing/2010/main" Requires="a14">
+      <mc:AlternateContent xmlns:mc="http://schemas.openxmlformats.org/markup-compatibility/2006" xmlns:a14="http://schemas.microsoft.com/office/drawing/2010/main">
+        <mc:Choice Requires="a14">
           <p:sp>
             <p:nvSpPr>
               <p:cNvPr id="12" name="Textplatzhalter 3">
@@ -16075,7 +16171,7 @@
             </p:txBody>
           </p:sp>
         </mc:Choice>
-        <mc:Fallback>
+        <mc:Fallback xmlns="">
           <p:sp>
             <p:nvSpPr>
               <p:cNvPr id="12" name="Textplatzhalter 3">
@@ -16491,8 +16587,8 @@
           </a:p>
         </p:txBody>
       </p:sp>
-      <mc:AlternateContent xmlns:mc="http://schemas.openxmlformats.org/markup-compatibility/2006">
-        <mc:Choice xmlns:a14="http://schemas.microsoft.com/office/drawing/2010/main" Requires="a14">
+      <mc:AlternateContent xmlns:mc="http://schemas.openxmlformats.org/markup-compatibility/2006" xmlns:a14="http://schemas.microsoft.com/office/drawing/2010/main">
+        <mc:Choice Requires="a14">
           <p:sp>
             <p:nvSpPr>
               <p:cNvPr id="7" name="Textfeld 6">
@@ -16521,6 +16617,7 @@
               </a:bodyPr>
               <a:lstStyle/>
               <a:p>
+                <a:pPr/>
                 <a14:m>
                   <m:oMathPara xmlns:m="http://schemas.openxmlformats.org/officeDocument/2006/math">
                     <m:oMathParaPr>
@@ -16683,7 +16780,7 @@
             </p:txBody>
           </p:sp>
         </mc:Choice>
-        <mc:Fallback>
+        <mc:Fallback xmlns="">
           <p:sp>
             <p:nvSpPr>
               <p:cNvPr id="7" name="Textfeld 6">
@@ -17567,8 +17664,8 @@
           </a:graphicData>
         </a:graphic>
       </p:graphicFrame>
-      <mc:AlternateContent xmlns:mc="http://schemas.openxmlformats.org/markup-compatibility/2006">
-        <mc:Choice xmlns:a14="http://schemas.microsoft.com/office/drawing/2010/main" Requires="a14">
+      <mc:AlternateContent xmlns:mc="http://schemas.openxmlformats.org/markup-compatibility/2006" xmlns:a14="http://schemas.microsoft.com/office/drawing/2010/main">
+        <mc:Choice Requires="a14">
           <p:sp>
             <p:nvSpPr>
               <p:cNvPr id="12" name="Textfeld 11">
@@ -17648,7 +17745,7 @@
             </p:txBody>
           </p:sp>
         </mc:Choice>
-        <mc:Fallback>
+        <mc:Fallback xmlns="">
           <p:sp>
             <p:nvSpPr>
               <p:cNvPr id="12" name="Textfeld 11">

</xml_diff>

<commit_message>
Small fixes to presentation
</commit_message>
<xml_diff>
--- a/presentation/interim-presentation.pptx
+++ b/presentation/interim-presentation.pptx
@@ -11292,34 +11292,6 @@
       </p:sp>
       <p:sp>
         <p:nvSpPr>
-          <p:cNvPr id="3" name="Inhaltsplatzhalter 2">
-            <a:extLst>
-              <a:ext uri="{FF2B5EF4-FFF2-40B4-BE49-F238E27FC236}">
-                <a16:creationId xmlns:a16="http://schemas.microsoft.com/office/drawing/2014/main" id="{EC23FB05-BBA1-2B4C-BD04-53685D217126}"/>
-              </a:ext>
-            </a:extLst>
-          </p:cNvPr>
-          <p:cNvSpPr>
-            <a:spLocks noGrp="1"/>
-          </p:cNvSpPr>
-          <p:nvPr>
-            <p:ph idx="1"/>
-          </p:nvPr>
-        </p:nvSpPr>
-        <p:spPr/>
-        <p:txBody>
-          <a:bodyPr/>
-          <a:lstStyle/>
-          <a:p>
-            <a:r>
-              <a:rPr lang="en-US" dirty="0"/>
-              <a:t>Describe documents as a probability distribution over topics</a:t>
-            </a:r>
-          </a:p>
-        </p:txBody>
-      </p:sp>
-      <p:sp>
-        <p:nvSpPr>
           <p:cNvPr id="4" name="Textplatzhalter 3">
             <a:extLst>
               <a:ext uri="{FF2B5EF4-FFF2-40B4-BE49-F238E27FC236}">
@@ -11334,13 +11306,15 @@
             <p:ph type="body" sz="quarter" idx="12"/>
           </p:nvPr>
         </p:nvSpPr>
-        <p:spPr/>
+        <p:spPr>
+          <a:xfrm>
+            <a:off x="383117" y="1294411"/>
+            <a:ext cx="11484000" cy="4141654"/>
+          </a:xfrm>
+        </p:spPr>
         <p:txBody>
           <a:bodyPr/>
           <a:lstStyle/>
-          <a:p>
-            <a:endParaRPr lang="en-US" dirty="0"/>
-          </a:p>
           <a:p>
             <a:pPr marL="285750" indent="-285750">
               <a:buFont typeface="Arial" panose="020B0604020202020204" pitchFamily="34" charset="0"/>
@@ -11348,28 +11322,18 @@
             </a:pPr>
             <a:r>
               <a:rPr lang="en-US" dirty="0"/>
-              <a:t>Document is represented by a vector of dimension </a:t>
+              <a:t>Documents are represented by probability distributions over </a:t>
             </a:r>
             <a:r>
               <a:rPr lang="en-US" i="1" dirty="0"/>
-              <a:t>k, </a:t>
+              <a:t>k</a:t>
             </a:r>
             <a:r>
               <a:rPr lang="en-US" dirty="0"/>
-              <a:t>such that component </a:t>
-            </a:r>
-            <a:r>
-              <a:rPr lang="en-US" i="1" dirty="0" err="1"/>
-              <a:t>i</a:t>
-            </a:r>
-            <a:r>
-              <a:rPr lang="en-US" dirty="0"/>
-              <a:t> describe the “affiliation” to topic </a:t>
-            </a:r>
-            <a:r>
-              <a:rPr lang="en-US" i="1" dirty="0" err="1"/>
-              <a:t>i</a:t>
-            </a:r>
+              <a:t> topics</a:t>
+            </a:r>
+          </a:p>
+          <a:p>
             <a:endParaRPr lang="en-US" i="1" dirty="0"/>
           </a:p>
           <a:p>
@@ -11377,16 +11341,26 @@
               <a:buFont typeface="Arial" panose="020B0604020202020204" pitchFamily="34" charset="0"/>
               <a:buChar char="•"/>
             </a:pPr>
-            <a:endParaRPr lang="en-US" i="1" dirty="0"/>
+            <a:r>
+              <a:rPr lang="en-US" dirty="0"/>
+              <a:t>Topics are probability distributions over words</a:t>
+            </a:r>
           </a:p>
           <a:p>
             <a:pPr marL="285750" indent="-285750">
               <a:buFont typeface="Arial" panose="020B0604020202020204" pitchFamily="34" charset="0"/>
               <a:buChar char="•"/>
             </a:pPr>
+            <a:endParaRPr lang="en-US" dirty="0"/>
+          </a:p>
+          <a:p>
+            <a:pPr marL="285750" indent="-285750">
+              <a:buFont typeface="Arial" panose="020B0604020202020204" pitchFamily="34" charset="0"/>
+              <a:buChar char="•"/>
+            </a:pPr>
             <a:r>
               <a:rPr lang="en-US" dirty="0"/>
-              <a:t>Topics are probability distributions over words</a:t>
+              <a:t>Assumption: Documents were created by sampling words from sampled topics</a:t>
             </a:r>
           </a:p>
           <a:p>
@@ -11506,141 +11480,6 @@
       </mc:AlternateContent>
       <p:sp>
         <p:nvSpPr>
-          <p:cNvPr id="6" name="Textfeld 5">
-            <a:extLst>
-              <a:ext uri="{FF2B5EF4-FFF2-40B4-BE49-F238E27FC236}">
-                <a16:creationId xmlns:a16="http://schemas.microsoft.com/office/drawing/2014/main" id="{8298C62C-B242-EF4C-8217-83015E8B050F}"/>
-              </a:ext>
-            </a:extLst>
-          </p:cNvPr>
-          <p:cNvSpPr txBox="1"/>
-          <p:nvPr/>
-        </p:nvSpPr>
-        <p:spPr>
-          <a:xfrm>
-            <a:off x="1304865" y="3999269"/>
-            <a:ext cx="2116926" cy="369332"/>
-          </a:xfrm>
-          <a:prstGeom prst="rect">
-            <a:avLst/>
-          </a:prstGeom>
-          <a:noFill/>
-        </p:spPr>
-        <p:txBody>
-          <a:bodyPr wrap="none" rtlCol="0">
-            <a:spAutoFit/>
-          </a:bodyPr>
-          <a:lstStyle/>
-          <a:p>
-            <a:r>
-              <a:rPr lang="en-US" dirty="0"/>
-              <a:t>Affiliation to topic 2</a:t>
-            </a:r>
-          </a:p>
-        </p:txBody>
-      </p:sp>
-      <p:sp>
-        <p:nvSpPr>
-          <p:cNvPr id="8" name="Rahmen 7">
-            <a:extLst>
-              <a:ext uri="{FF2B5EF4-FFF2-40B4-BE49-F238E27FC236}">
-                <a16:creationId xmlns:a16="http://schemas.microsoft.com/office/drawing/2014/main" id="{EA69E385-6976-7340-A487-62AB7C873979}"/>
-              </a:ext>
-            </a:extLst>
-          </p:cNvPr>
-          <p:cNvSpPr/>
-          <p:nvPr/>
-        </p:nvSpPr>
-        <p:spPr>
-          <a:xfrm>
-            <a:off x="2002420" y="4794634"/>
-            <a:ext cx="659757" cy="548294"/>
-          </a:xfrm>
-          <a:prstGeom prst="frame">
-            <a:avLst/>
-          </a:prstGeom>
-          <a:solidFill>
-            <a:srgbClr val="E30065"/>
-          </a:solidFill>
-          <a:ln>
-            <a:noFill/>
-          </a:ln>
-        </p:spPr>
-        <p:style>
-          <a:lnRef idx="2">
-            <a:schemeClr val="accent1">
-              <a:shade val="50000"/>
-            </a:schemeClr>
-          </a:lnRef>
-          <a:fillRef idx="1">
-            <a:schemeClr val="accent1"/>
-          </a:fillRef>
-          <a:effectRef idx="0">
-            <a:schemeClr val="accent1"/>
-          </a:effectRef>
-          <a:fontRef idx="minor">
-            <a:schemeClr val="lt1"/>
-          </a:fontRef>
-        </p:style>
-        <p:txBody>
-          <a:bodyPr rtlCol="0" anchor="ctr"/>
-          <a:lstStyle/>
-          <a:p>
-            <a:pPr algn="ctr"/>
-            <a:endParaRPr lang="en-US">
-              <a:solidFill>
-                <a:schemeClr val="tx1"/>
-              </a:solidFill>
-            </a:endParaRPr>
-          </a:p>
-        </p:txBody>
-      </p:sp>
-      <p:cxnSp>
-        <p:nvCxnSpPr>
-          <p:cNvPr id="10" name="Gerade Verbindung 9">
-            <a:extLst>
-              <a:ext uri="{FF2B5EF4-FFF2-40B4-BE49-F238E27FC236}">
-                <a16:creationId xmlns:a16="http://schemas.microsoft.com/office/drawing/2014/main" id="{A84D2C00-7C4A-5D40-9034-E87C5862CAA6}"/>
-              </a:ext>
-            </a:extLst>
-          </p:cNvPr>
-          <p:cNvCxnSpPr>
-            <a:cxnSpLocks/>
-            <a:stCxn id="8" idx="0"/>
-          </p:cNvCxnSpPr>
-          <p:nvPr/>
-        </p:nvCxnSpPr>
-        <p:spPr>
-          <a:xfrm flipV="1">
-            <a:off x="2332299" y="4396072"/>
-            <a:ext cx="0" cy="398562"/>
-          </a:xfrm>
-          <a:prstGeom prst="line">
-            <a:avLst/>
-          </a:prstGeom>
-          <a:ln w="57150">
-            <a:solidFill>
-              <a:srgbClr val="E30065"/>
-            </a:solidFill>
-          </a:ln>
-        </p:spPr>
-        <p:style>
-          <a:lnRef idx="1">
-            <a:schemeClr val="accent1"/>
-          </a:lnRef>
-          <a:fillRef idx="0">
-            <a:schemeClr val="accent1"/>
-          </a:fillRef>
-          <a:effectRef idx="0">
-            <a:schemeClr val="accent1"/>
-          </a:effectRef>
-          <a:fontRef idx="minor">
-            <a:schemeClr val="tx1"/>
-          </a:fontRef>
-        </p:style>
-      </p:cxnSp>
-      <p:sp>
-        <p:nvSpPr>
           <p:cNvPr id="13" name="Textfeld 12">
             <a:extLst>
               <a:ext uri="{FF2B5EF4-FFF2-40B4-BE49-F238E27FC236}">
@@ -11717,7 +11556,7 @@
         <p:spPr>
           <a:xfrm>
             <a:off x="648724" y="5465294"/>
-            <a:ext cx="3429208" cy="369332"/>
+            <a:ext cx="4621843" cy="369332"/>
           </a:xfrm>
           <a:prstGeom prst="rect">
             <a:avLst/>
@@ -11732,7 +11571,7 @@
           <a:p>
             <a:r>
               <a:rPr lang="en-US" dirty="0"/>
-              <a:t>Topic distribution of a document</a:t>
+              <a:t>Topic distribution of a document for 3 topics</a:t>
             </a:r>
           </a:p>
         </p:txBody>
@@ -17664,8 +17503,8 @@
           </a:graphicData>
         </a:graphic>
       </p:graphicFrame>
-      <mc:AlternateContent xmlns:mc="http://schemas.openxmlformats.org/markup-compatibility/2006" xmlns:a14="http://schemas.microsoft.com/office/drawing/2010/main">
-        <mc:Choice Requires="a14">
+      <mc:AlternateContent xmlns:mc="http://schemas.openxmlformats.org/markup-compatibility/2006">
+        <mc:Choice xmlns:a14="http://schemas.microsoft.com/office/drawing/2010/main" Requires="a14">
           <p:sp>
             <p:nvSpPr>
               <p:cNvPr id="12" name="Textfeld 11">
@@ -17694,58 +17533,65 @@
               </a:bodyPr>
               <a:lstStyle/>
               <a:p>
-                <a:r>
-                  <a:rPr lang="de-DE" b="0" dirty="0"/>
-                  <a:t>1-Hot</a:t>
-                </a:r>
                 <a14:m>
-                  <m:oMath xmlns:m="http://schemas.openxmlformats.org/officeDocument/2006/math">
-                    <m:d>
-                      <m:dPr>
-                        <m:ctrlPr>
-                          <a:rPr lang="de-DE" b="0" i="1" smtClean="0">
-                            <a:latin typeface="Cambria Math" panose="02040503050406030204" pitchFamily="18" charset="0"/>
-                          </a:rPr>
-                        </m:ctrlPr>
-                      </m:dPr>
-                      <m:e>
-                        <m:r>
-                          <a:rPr lang="de-DE" b="0" i="1" smtClean="0">
-                            <a:latin typeface="Cambria Math" panose="02040503050406030204" pitchFamily="18" charset="0"/>
-                          </a:rPr>
-                          <m:t>„</m:t>
-                        </m:r>
-                        <m:r>
-                          <m:rPr>
-                            <m:sty m:val="p"/>
-                          </m:rPr>
-                          <a:rPr lang="de-DE" b="0" i="0" smtClean="0">
-                            <a:latin typeface="Cambria Math" panose="02040503050406030204" pitchFamily="18" charset="0"/>
-                          </a:rPr>
-                          <m:t>Consultation</m:t>
-                        </m:r>
-                        <m:r>
-                          <a:rPr lang="de-DE" b="0" i="1" smtClean="0">
-                            <a:latin typeface="Cambria Math" panose="02040503050406030204" pitchFamily="18" charset="0"/>
-                          </a:rPr>
-                          <m:t>“</m:t>
-                        </m:r>
-                      </m:e>
-                    </m:d>
-                    <m:r>
-                      <a:rPr lang="de-DE" b="0" i="1" smtClean="0">
-                        <a:latin typeface="Cambria Math" panose="02040503050406030204" pitchFamily="18" charset="0"/>
-                      </a:rPr>
-                      <m:t>=(0,1,0,0,0)</m:t>
-                    </m:r>
-                  </m:oMath>
+                  <m:oMathPara xmlns:m="http://schemas.openxmlformats.org/officeDocument/2006/math">
+                    <m:oMathParaPr>
+                      <m:jc m:val="centerGroup"/>
+                    </m:oMathParaPr>
+                    <m:oMath xmlns:m="http://schemas.openxmlformats.org/officeDocument/2006/math">
+                      <m:r>
+                        <a:rPr lang="de-DE" b="0" i="1" smtClean="0">
+                          <a:latin typeface="Cambria Math" panose="02040503050406030204" pitchFamily="18" charset="0"/>
+                        </a:rPr>
+                        <m:t>1</m:t>
+                      </m:r>
+                      <m:d>
+                        <m:dPr>
+                          <m:ctrlPr>
+                            <a:rPr lang="de-DE" b="0" i="1" smtClean="0">
+                              <a:latin typeface="Cambria Math" panose="02040503050406030204" pitchFamily="18" charset="0"/>
+                            </a:rPr>
+                          </m:ctrlPr>
+                        </m:dPr>
+                        <m:e>
+                          <m:r>
+                            <a:rPr lang="de-DE" b="0" i="1" smtClean="0">
+                              <a:latin typeface="Cambria Math" panose="02040503050406030204" pitchFamily="18" charset="0"/>
+                            </a:rPr>
+                            <m:t>„</m:t>
+                          </m:r>
+                          <m:r>
+                            <m:rPr>
+                              <m:sty m:val="p"/>
+                            </m:rPr>
+                            <a:rPr lang="de-DE" b="0" i="0" smtClean="0">
+                              <a:latin typeface="Cambria Math" panose="02040503050406030204" pitchFamily="18" charset="0"/>
+                            </a:rPr>
+                            <m:t>Consultation</m:t>
+                          </m:r>
+                          <m:r>
+                            <a:rPr lang="de-DE" b="0" i="1" smtClean="0">
+                              <a:latin typeface="Cambria Math" panose="02040503050406030204" pitchFamily="18" charset="0"/>
+                            </a:rPr>
+                            <m:t>“</m:t>
+                          </m:r>
+                        </m:e>
+                      </m:d>
+                      <m:r>
+                        <a:rPr lang="de-DE" b="0" i="1" smtClean="0">
+                          <a:latin typeface="Cambria Math" panose="02040503050406030204" pitchFamily="18" charset="0"/>
+                        </a:rPr>
+                        <m:t>=(0,1,0,0,0)</m:t>
+                      </m:r>
+                    </m:oMath>
+                  </m:oMathPara>
                 </a14:m>
                 <a:endParaRPr lang="en-US" dirty="0"/>
               </a:p>
             </p:txBody>
           </p:sp>
         </mc:Choice>
-        <mc:Fallback xmlns="">
+        <mc:Fallback>
           <p:sp>
             <p:nvSpPr>
               <p:cNvPr id="12" name="Textfeld 11">
@@ -17771,7 +17617,7 @@
               <a:blipFill>
                 <a:blip r:embed="rId3"/>
                 <a:stretch>
-                  <a:fillRect l="-4152" t="-28571" b="-57143"/>
+                  <a:fillRect b="-42857"/>
                 </a:stretch>
               </a:blipFill>
             </p:spPr>

</xml_diff>